<commit_message>
TF-1 First Content "Complete"  Draft
Completed initial content especially in sections TF-1 11, 12 & 13.
</commit_message>
<xml_diff>
--- a/SDPi_Supplement/sources/vol1-diagram-sdpi-a-actor.pptx
+++ b/SDPi_Supplement/sources/vol1-diagram-sdpi-a-actor.pptx
@@ -259,7 +259,7 @@
           <a:p>
             <a:fld id="{CEAB79FE-F2B8-4F38-B4B7-E17A89FC2611}" type="datetimeFigureOut">
               <a:rPr lang="en-US" smtClean="0"/>
-              <a:t>11/7/2022</a:t>
+              <a:t>2/21/2023</a:t>
             </a:fld>
             <a:endParaRPr lang="en-US"/>
           </a:p>
@@ -457,7 +457,7 @@
           <a:p>
             <a:fld id="{CEAB79FE-F2B8-4F38-B4B7-E17A89FC2611}" type="datetimeFigureOut">
               <a:rPr lang="en-US" smtClean="0"/>
-              <a:t>11/7/2022</a:t>
+              <a:t>2/21/2023</a:t>
             </a:fld>
             <a:endParaRPr lang="en-US"/>
           </a:p>
@@ -665,7 +665,7 @@
           <a:p>
             <a:fld id="{CEAB79FE-F2B8-4F38-B4B7-E17A89FC2611}" type="datetimeFigureOut">
               <a:rPr lang="en-US" smtClean="0"/>
-              <a:t>11/7/2022</a:t>
+              <a:t>2/21/2023</a:t>
             </a:fld>
             <a:endParaRPr lang="en-US"/>
           </a:p>
@@ -863,7 +863,7 @@
           <a:p>
             <a:fld id="{CEAB79FE-F2B8-4F38-B4B7-E17A89FC2611}" type="datetimeFigureOut">
               <a:rPr lang="en-US" smtClean="0"/>
-              <a:t>11/7/2022</a:t>
+              <a:t>2/21/2023</a:t>
             </a:fld>
             <a:endParaRPr lang="en-US"/>
           </a:p>
@@ -1138,7 +1138,7 @@
           <a:p>
             <a:fld id="{CEAB79FE-F2B8-4F38-B4B7-E17A89FC2611}" type="datetimeFigureOut">
               <a:rPr lang="en-US" smtClean="0"/>
-              <a:t>11/7/2022</a:t>
+              <a:t>2/21/2023</a:t>
             </a:fld>
             <a:endParaRPr lang="en-US"/>
           </a:p>
@@ -1403,7 +1403,7 @@
           <a:p>
             <a:fld id="{CEAB79FE-F2B8-4F38-B4B7-E17A89FC2611}" type="datetimeFigureOut">
               <a:rPr lang="en-US" smtClean="0"/>
-              <a:t>11/7/2022</a:t>
+              <a:t>2/21/2023</a:t>
             </a:fld>
             <a:endParaRPr lang="en-US"/>
           </a:p>
@@ -1815,7 +1815,7 @@
           <a:p>
             <a:fld id="{CEAB79FE-F2B8-4F38-B4B7-E17A89FC2611}" type="datetimeFigureOut">
               <a:rPr lang="en-US" smtClean="0"/>
-              <a:t>11/7/2022</a:t>
+              <a:t>2/21/2023</a:t>
             </a:fld>
             <a:endParaRPr lang="en-US"/>
           </a:p>
@@ -1956,7 +1956,7 @@
           <a:p>
             <a:fld id="{CEAB79FE-F2B8-4F38-B4B7-E17A89FC2611}" type="datetimeFigureOut">
               <a:rPr lang="en-US" smtClean="0"/>
-              <a:t>11/7/2022</a:t>
+              <a:t>2/21/2023</a:t>
             </a:fld>
             <a:endParaRPr lang="en-US"/>
           </a:p>
@@ -2069,7 +2069,7 @@
           <a:p>
             <a:fld id="{CEAB79FE-F2B8-4F38-B4B7-E17A89FC2611}" type="datetimeFigureOut">
               <a:rPr lang="en-US" smtClean="0"/>
-              <a:t>11/7/2022</a:t>
+              <a:t>2/21/2023</a:t>
             </a:fld>
             <a:endParaRPr lang="en-US"/>
           </a:p>
@@ -2380,7 +2380,7 @@
           <a:p>
             <a:fld id="{CEAB79FE-F2B8-4F38-B4B7-E17A89FC2611}" type="datetimeFigureOut">
               <a:rPr lang="en-US" smtClean="0"/>
-              <a:t>11/7/2022</a:t>
+              <a:t>2/21/2023</a:t>
             </a:fld>
             <a:endParaRPr lang="en-US"/>
           </a:p>
@@ -2668,7 +2668,7 @@
           <a:p>
             <a:fld id="{CEAB79FE-F2B8-4F38-B4B7-E17A89FC2611}" type="datetimeFigureOut">
               <a:rPr lang="en-US" smtClean="0"/>
-              <a:t>11/7/2022</a:t>
+              <a:t>2/21/2023</a:t>
             </a:fld>
             <a:endParaRPr lang="en-US"/>
           </a:p>
@@ -2909,7 +2909,7 @@
           <a:p>
             <a:fld id="{CEAB79FE-F2B8-4F38-B4B7-E17A89FC2611}" type="datetimeFigureOut">
               <a:rPr lang="en-US" smtClean="0"/>
-              <a:t>11/7/2022</a:t>
+              <a:t>2/21/2023</a:t>
             </a:fld>
             <a:endParaRPr lang="en-US"/>
           </a:p>
@@ -3953,12 +3953,72 @@
           </a:fontRef>
         </p:style>
       </p:cxnSp>
+      <p:sp>
+        <p:nvSpPr>
+          <p:cNvPr id="43" name="Rectangle 42">
+            <a:extLst>
+              <a:ext uri="{FF2B5EF4-FFF2-40B4-BE49-F238E27FC236}">
+                <a16:creationId xmlns:a16="http://schemas.microsoft.com/office/drawing/2014/main" id="{E554214D-4B0F-4572-A6C5-3185392F483C}"/>
+              </a:ext>
+            </a:extLst>
+          </p:cNvPr>
+          <p:cNvSpPr/>
+          <p:nvPr/>
+        </p:nvSpPr>
+        <p:spPr>
+          <a:xfrm>
+            <a:off x="9238467" y="4255387"/>
+            <a:ext cx="1668683" cy="951244"/>
+          </a:xfrm>
+          <a:prstGeom prst="rect">
+            <a:avLst/>
+          </a:prstGeom>
+          <a:noFill/>
+          <a:ln w="12700">
+            <a:solidFill>
+              <a:schemeClr val="tx1"/>
+            </a:solidFill>
+            <a:prstDash val="dash"/>
+          </a:ln>
+        </p:spPr>
+        <p:style>
+          <a:lnRef idx="2">
+            <a:schemeClr val="accent1">
+              <a:shade val="50000"/>
+            </a:schemeClr>
+          </a:lnRef>
+          <a:fillRef idx="1">
+            <a:schemeClr val="accent1"/>
+          </a:fillRef>
+          <a:effectRef idx="0">
+            <a:schemeClr val="accent1"/>
+          </a:effectRef>
+          <a:fontRef idx="minor">
+            <a:schemeClr val="lt1"/>
+          </a:fontRef>
+        </p:style>
+        <p:txBody>
+          <a:bodyPr rtlCol="0" anchor="ctr" anchorCtr="0"/>
+          <a:lstStyle/>
+          <a:p>
+            <a:pPr algn="ctr"/>
+            <a:r>
+              <a:rPr lang="en-US" dirty="0">
+                <a:solidFill>
+                  <a:schemeClr val="tx1"/>
+                </a:solidFill>
+              </a:rPr>
+              <a:t>DEV ACM</a:t>
+            </a:r>
+          </a:p>
+        </p:txBody>
+      </p:sp>
       <p:grpSp>
         <p:nvGrpSpPr>
-          <p:cNvPr id="120" name="Group 119">
-            <a:extLst>
-              <a:ext uri="{FF2B5EF4-FFF2-40B4-BE49-F238E27FC236}">
-                <a16:creationId xmlns:a16="http://schemas.microsoft.com/office/drawing/2014/main" id="{E552B81A-4E42-40E3-8565-27F8B966CF35}"/>
+          <p:cNvPr id="58" name="Group 57">
+            <a:extLst>
+              <a:ext uri="{FF2B5EF4-FFF2-40B4-BE49-F238E27FC236}">
+                <a16:creationId xmlns:a16="http://schemas.microsoft.com/office/drawing/2014/main" id="{44127504-210F-40C5-8D51-5BAF1DB0E7BF}"/>
               </a:ext>
             </a:extLst>
           </p:cNvPr>
@@ -3967,18 +4027,18 @@
         </p:nvGrpSpPr>
         <p:grpSpPr>
           <a:xfrm>
-            <a:off x="6941915" y="4231230"/>
-            <a:ext cx="3965235" cy="1583564"/>
-            <a:chOff x="6772081" y="4954862"/>
-            <a:chExt cx="3965235" cy="1583564"/>
+            <a:off x="6941915" y="4233555"/>
+            <a:ext cx="1534050" cy="1581239"/>
+            <a:chOff x="7967835" y="4746171"/>
+            <a:chExt cx="1534050" cy="1581239"/>
           </a:xfrm>
         </p:grpSpPr>
         <p:sp>
           <p:nvSpPr>
-            <p:cNvPr id="43" name="Rectangle 42">
+            <p:cNvPr id="38" name="Rectangle 37">
               <a:extLst>
                 <a:ext uri="{FF2B5EF4-FFF2-40B4-BE49-F238E27FC236}">
-                  <a16:creationId xmlns:a16="http://schemas.microsoft.com/office/drawing/2014/main" id="{E554214D-4B0F-4572-A6C5-3185392F483C}"/>
+                  <a16:creationId xmlns:a16="http://schemas.microsoft.com/office/drawing/2014/main" id="{EA47650F-24B8-47F8-81C1-EAD8604E55FB}"/>
                 </a:ext>
               </a:extLst>
             </p:cNvPr>
@@ -3987,18 +4047,19 @@
           </p:nvSpPr>
           <p:spPr>
             <a:xfrm>
-              <a:off x="9068633" y="4979019"/>
-              <a:ext cx="1668683" cy="951244"/>
+              <a:off x="7967835" y="4746171"/>
+              <a:ext cx="1534050" cy="951244"/>
             </a:xfrm>
             <a:prstGeom prst="rect">
               <a:avLst/>
             </a:prstGeom>
-            <a:noFill/>
-            <a:ln w="12700">
+            <a:solidFill>
+              <a:schemeClr val="bg1"/>
+            </a:solidFill>
+            <a:ln w="6350">
               <a:solidFill>
                 <a:schemeClr val="tx1"/>
               </a:solidFill>
-              <a:prstDash val="dash"/>
             </a:ln>
           </p:spPr>
           <p:style>
@@ -4018,40 +4079,405 @@
             </a:fontRef>
           </p:style>
           <p:txBody>
-            <a:bodyPr rtlCol="0" anchor="ctr" anchorCtr="0"/>
+            <a:bodyPr rtlCol="0" anchor="ctr" anchorCtr="1"/>
             <a:lstStyle/>
             <a:p>
               <a:pPr algn="ctr"/>
               <a:r>
-                <a:rPr lang="en-US" dirty="0">
+                <a:rPr lang="en-US" b="1" dirty="0">
                   <a:solidFill>
                     <a:schemeClr val="tx1"/>
                   </a:solidFill>
                 </a:rPr>
-                <a:t>DEV ACM</a:t>
+                <a:t>SOMDS </a:t>
+              </a:r>
+            </a:p>
+            <a:p>
+              <a:pPr algn="ctr"/>
+              <a:r>
+                <a:rPr lang="en-US" b="1" dirty="0">
+                  <a:solidFill>
+                    <a:schemeClr val="tx1"/>
+                  </a:solidFill>
+                </a:rPr>
+                <a:t>ACM Gateway</a:t>
               </a:r>
             </a:p>
           </p:txBody>
         </p:sp>
+        <p:sp>
+          <p:nvSpPr>
+            <p:cNvPr id="57" name="Rectangle 56">
+              <a:extLst>
+                <a:ext uri="{FF2B5EF4-FFF2-40B4-BE49-F238E27FC236}">
+                  <a16:creationId xmlns:a16="http://schemas.microsoft.com/office/drawing/2014/main" id="{28B54E69-316E-4739-BFC6-68E6480FE06F}"/>
+                </a:ext>
+              </a:extLst>
+            </p:cNvPr>
+            <p:cNvSpPr/>
+            <p:nvPr/>
+          </p:nvSpPr>
+          <p:spPr>
+            <a:xfrm>
+              <a:off x="7968343" y="5701713"/>
+              <a:ext cx="1533542" cy="625697"/>
+            </a:xfrm>
+            <a:prstGeom prst="rect">
+              <a:avLst/>
+            </a:prstGeom>
+            <a:solidFill>
+              <a:schemeClr val="bg1"/>
+            </a:solidFill>
+            <a:ln w="6350">
+              <a:solidFill>
+                <a:schemeClr val="tx1"/>
+              </a:solidFill>
+            </a:ln>
+          </p:spPr>
+          <p:style>
+            <a:lnRef idx="2">
+              <a:schemeClr val="accent1">
+                <a:shade val="50000"/>
+              </a:schemeClr>
+            </a:lnRef>
+            <a:fillRef idx="1">
+              <a:schemeClr val="accent1"/>
+            </a:fillRef>
+            <a:effectRef idx="0">
+              <a:schemeClr val="accent1"/>
+            </a:effectRef>
+            <a:fontRef idx="minor">
+              <a:schemeClr val="lt1"/>
+            </a:fontRef>
+          </p:style>
+          <p:txBody>
+            <a:bodyPr rtlCol="0" anchor="ctr" anchorCtr="1"/>
+            <a:lstStyle/>
+            <a:p>
+              <a:pPr algn="ctr"/>
+              <a:r>
+                <a:rPr lang="en-US" b="1" dirty="0">
+                  <a:solidFill>
+                    <a:schemeClr val="tx1"/>
+                  </a:solidFill>
+                </a:rPr>
+                <a:t>SOMDS V2 Gateway</a:t>
+              </a:r>
+            </a:p>
+          </p:txBody>
+        </p:sp>
+      </p:grpSp>
+      <p:sp>
+        <p:nvSpPr>
+          <p:cNvPr id="122" name="TextBox 121">
+            <a:extLst>
+              <a:ext uri="{FF2B5EF4-FFF2-40B4-BE49-F238E27FC236}">
+                <a16:creationId xmlns:a16="http://schemas.microsoft.com/office/drawing/2014/main" id="{11A13635-0767-4EDF-8B12-E6C96938A5B1}"/>
+              </a:ext>
+            </a:extLst>
+          </p:cNvPr>
+          <p:cNvSpPr txBox="1"/>
+          <p:nvPr/>
+        </p:nvSpPr>
+        <p:spPr>
+          <a:xfrm>
+            <a:off x="3819891" y="3432933"/>
+            <a:ext cx="1786975" cy="523220"/>
+          </a:xfrm>
+          <a:prstGeom prst="rect">
+            <a:avLst/>
+          </a:prstGeom>
+          <a:noFill/>
+        </p:spPr>
+        <p:txBody>
+          <a:bodyPr wrap="square" rtlCol="0">
+            <a:spAutoFit/>
+          </a:bodyPr>
+          <a:lstStyle/>
+          <a:p>
+            <a:r>
+              <a:rPr lang="en-US" sz="1400" b="1" dirty="0"/>
+              <a:t>DEV-42  Delegate Medical Alert</a:t>
+            </a:r>
+            <a:endParaRPr lang="en-US" sz="1600" b="1" dirty="0"/>
+          </a:p>
+        </p:txBody>
+      </p:sp>
+      <p:sp>
+        <p:nvSpPr>
+          <p:cNvPr id="125" name="TextBox 124">
+            <a:extLst>
+              <a:ext uri="{FF2B5EF4-FFF2-40B4-BE49-F238E27FC236}">
+                <a16:creationId xmlns:a16="http://schemas.microsoft.com/office/drawing/2014/main" id="{68B13C05-354D-4B41-BD25-0D51758A5F86}"/>
+              </a:ext>
+            </a:extLst>
+          </p:cNvPr>
+          <p:cNvSpPr txBox="1"/>
+          <p:nvPr/>
+        </p:nvSpPr>
+        <p:spPr>
+          <a:xfrm>
+            <a:off x="1486305" y="2884255"/>
+            <a:ext cx="2069327" cy="523220"/>
+          </a:xfrm>
+          <a:prstGeom prst="rect">
+            <a:avLst/>
+          </a:prstGeom>
+          <a:noFill/>
+        </p:spPr>
+        <p:txBody>
+          <a:bodyPr wrap="square" rtlCol="0">
+            <a:spAutoFit/>
+          </a:bodyPr>
+          <a:lstStyle/>
+          <a:p>
+            <a:r>
+              <a:rPr lang="en-US" sz="1400" b="1" dirty="0"/>
+              <a:t>DEV-40  Retrieve Medical Alert Status</a:t>
+            </a:r>
+            <a:endParaRPr lang="en-US" sz="1600" b="1" dirty="0"/>
+          </a:p>
+        </p:txBody>
+      </p:sp>
+      <p:sp>
+        <p:nvSpPr>
+          <p:cNvPr id="128" name="TextBox 127">
+            <a:extLst>
+              <a:ext uri="{FF2B5EF4-FFF2-40B4-BE49-F238E27FC236}">
+                <a16:creationId xmlns:a16="http://schemas.microsoft.com/office/drawing/2014/main" id="{9E4F6F83-F9C6-44F4-AE44-133242813C34}"/>
+              </a:ext>
+            </a:extLst>
+          </p:cNvPr>
+          <p:cNvSpPr txBox="1"/>
+          <p:nvPr/>
+        </p:nvSpPr>
+        <p:spPr>
+          <a:xfrm>
+            <a:off x="5944623" y="4228885"/>
+            <a:ext cx="1210822" cy="307777"/>
+          </a:xfrm>
+          <a:prstGeom prst="rect">
+            <a:avLst/>
+          </a:prstGeom>
+          <a:noFill/>
+        </p:spPr>
+        <p:txBody>
+          <a:bodyPr wrap="square" rtlCol="0">
+            <a:spAutoFit/>
+          </a:bodyPr>
+          <a:lstStyle/>
+          <a:p>
+            <a:r>
+              <a:rPr lang="en-US" sz="1400" b="1" dirty="0"/>
+              <a:t>DEV-38</a:t>
+            </a:r>
+            <a:endParaRPr lang="en-US" sz="1600" b="1" dirty="0"/>
+          </a:p>
+        </p:txBody>
+      </p:sp>
+      <p:sp>
+        <p:nvSpPr>
+          <p:cNvPr id="130" name="TextBox 129">
+            <a:extLst>
+              <a:ext uri="{FF2B5EF4-FFF2-40B4-BE49-F238E27FC236}">
+                <a16:creationId xmlns:a16="http://schemas.microsoft.com/office/drawing/2014/main" id="{44187627-A7B1-4C14-B8D8-97827428FD25}"/>
+              </a:ext>
+            </a:extLst>
+          </p:cNvPr>
+          <p:cNvSpPr txBox="1"/>
+          <p:nvPr/>
+        </p:nvSpPr>
+        <p:spPr>
+          <a:xfrm>
+            <a:off x="1486304" y="3918684"/>
+            <a:ext cx="2202739" cy="523220"/>
+          </a:xfrm>
+          <a:prstGeom prst="rect">
+            <a:avLst/>
+          </a:prstGeom>
+          <a:noFill/>
+        </p:spPr>
+        <p:txBody>
+          <a:bodyPr wrap="square" rtlCol="0">
+            <a:spAutoFit/>
+          </a:bodyPr>
+          <a:lstStyle/>
+          <a:p>
+            <a:r>
+              <a:rPr lang="en-US" sz="1400" b="1" dirty="0"/>
+              <a:t>DEV-43  Update Alert Acknowledgement Status</a:t>
+            </a:r>
+            <a:endParaRPr lang="en-US" sz="1600" b="1" dirty="0"/>
+          </a:p>
+        </p:txBody>
+      </p:sp>
+      <p:sp>
+        <p:nvSpPr>
+          <p:cNvPr id="134" name="TextBox 133">
+            <a:extLst>
+              <a:ext uri="{FF2B5EF4-FFF2-40B4-BE49-F238E27FC236}">
+                <a16:creationId xmlns:a16="http://schemas.microsoft.com/office/drawing/2014/main" id="{77799404-9EC7-4B77-9605-1C7459A69B04}"/>
+              </a:ext>
+            </a:extLst>
+          </p:cNvPr>
+          <p:cNvSpPr txBox="1"/>
+          <p:nvPr/>
+        </p:nvSpPr>
+        <p:spPr>
+          <a:xfrm>
+            <a:off x="5944623" y="4418567"/>
+            <a:ext cx="1210823" cy="307777"/>
+          </a:xfrm>
+          <a:prstGeom prst="rect">
+            <a:avLst/>
+          </a:prstGeom>
+          <a:noFill/>
+        </p:spPr>
+        <p:txBody>
+          <a:bodyPr wrap="square" rtlCol="0">
+            <a:spAutoFit/>
+          </a:bodyPr>
+          <a:lstStyle/>
+          <a:p>
+            <a:r>
+              <a:rPr lang="en-US" sz="1400" b="1" dirty="0"/>
+              <a:t>DEV-40</a:t>
+            </a:r>
+            <a:endParaRPr lang="en-US" sz="1600" b="1" dirty="0"/>
+          </a:p>
+        </p:txBody>
+      </p:sp>
+      <p:sp>
+        <p:nvSpPr>
+          <p:cNvPr id="136" name="TextBox 135">
+            <a:extLst>
+              <a:ext uri="{FF2B5EF4-FFF2-40B4-BE49-F238E27FC236}">
+                <a16:creationId xmlns:a16="http://schemas.microsoft.com/office/drawing/2014/main" id="{A038C248-B180-477E-8CB9-8157FCDF9BBC}"/>
+              </a:ext>
+            </a:extLst>
+          </p:cNvPr>
+          <p:cNvSpPr txBox="1"/>
+          <p:nvPr/>
+        </p:nvSpPr>
+        <p:spPr>
+          <a:xfrm>
+            <a:off x="5944623" y="4584880"/>
+            <a:ext cx="1210823" cy="307777"/>
+          </a:xfrm>
+          <a:prstGeom prst="rect">
+            <a:avLst/>
+          </a:prstGeom>
+          <a:noFill/>
+        </p:spPr>
+        <p:txBody>
+          <a:bodyPr wrap="square" rtlCol="0">
+            <a:spAutoFit/>
+          </a:bodyPr>
+          <a:lstStyle/>
+          <a:p>
+            <a:r>
+              <a:rPr lang="en-US" sz="1400" b="1" dirty="0"/>
+              <a:t>DEV-43</a:t>
+            </a:r>
+            <a:endParaRPr lang="en-US" sz="1600" b="1" dirty="0"/>
+          </a:p>
+        </p:txBody>
+      </p:sp>
+      <p:sp>
+        <p:nvSpPr>
+          <p:cNvPr id="2" name="Rectangle 1">
+            <a:extLst>
+              <a:ext uri="{FF2B5EF4-FFF2-40B4-BE49-F238E27FC236}">
+                <a16:creationId xmlns:a16="http://schemas.microsoft.com/office/drawing/2014/main" id="{CCC843D0-5E6F-4EEE-8B5F-BBB28E3EBA0E}"/>
+              </a:ext>
+            </a:extLst>
+          </p:cNvPr>
+          <p:cNvSpPr/>
+          <p:nvPr/>
+        </p:nvSpPr>
+        <p:spPr>
+          <a:xfrm>
+            <a:off x="1284850" y="1043205"/>
+            <a:ext cx="4322016" cy="4771575"/>
+          </a:xfrm>
+          <a:prstGeom prst="rect">
+            <a:avLst/>
+          </a:prstGeom>
+          <a:noFill/>
+          <a:ln w="12700">
+            <a:solidFill>
+              <a:schemeClr val="tx1"/>
+            </a:solidFill>
+            <a:prstDash val="dash"/>
+          </a:ln>
+        </p:spPr>
+        <p:style>
+          <a:lnRef idx="2">
+            <a:schemeClr val="accent1">
+              <a:shade val="50000"/>
+            </a:schemeClr>
+          </a:lnRef>
+          <a:fillRef idx="1">
+            <a:schemeClr val="accent1"/>
+          </a:fillRef>
+          <a:effectRef idx="0">
+            <a:schemeClr val="accent1"/>
+          </a:effectRef>
+          <a:fontRef idx="minor">
+            <a:schemeClr val="lt1"/>
+          </a:fontRef>
+        </p:style>
+        <p:txBody>
+          <a:bodyPr rtlCol="0" anchor="b" anchorCtr="0"/>
+          <a:lstStyle/>
+          <a:p>
+            <a:pPr algn="ctr"/>
+            <a:endParaRPr lang="en-US" dirty="0">
+              <a:solidFill>
+                <a:schemeClr val="tx1"/>
+              </a:solidFill>
+            </a:endParaRPr>
+          </a:p>
+        </p:txBody>
+      </p:sp>
+      <p:grpSp>
+        <p:nvGrpSpPr>
+          <p:cNvPr id="7" name="Group 6">
+            <a:extLst>
+              <a:ext uri="{FF2B5EF4-FFF2-40B4-BE49-F238E27FC236}">
+                <a16:creationId xmlns:a16="http://schemas.microsoft.com/office/drawing/2014/main" id="{E9FF61DA-F6E4-297C-25C6-B8B26C9B776B}"/>
+              </a:ext>
+            </a:extLst>
+          </p:cNvPr>
+          <p:cNvGrpSpPr/>
+          <p:nvPr/>
+        </p:nvGrpSpPr>
+        <p:grpSpPr>
+          <a:xfrm>
+            <a:off x="8438139" y="4015476"/>
+            <a:ext cx="854574" cy="1592709"/>
+            <a:chOff x="8438139" y="4015476"/>
+            <a:chExt cx="854574" cy="1592709"/>
+          </a:xfrm>
+        </p:grpSpPr>
         <p:cxnSp>
           <p:nvCxnSpPr>
-            <p:cNvPr id="48" name="Straight Arrow Connector 47">
+            <p:cNvPr id="49" name="Straight Arrow Connector 48">
               <a:extLst>
                 <a:ext uri="{FF2B5EF4-FFF2-40B4-BE49-F238E27FC236}">
-                  <a16:creationId xmlns:a16="http://schemas.microsoft.com/office/drawing/2014/main" id="{1E7A4FE6-F54F-40CD-99F7-CD1A5FB8E5C1}"/>
+                  <a16:creationId xmlns:a16="http://schemas.microsoft.com/office/drawing/2014/main" id="{F94709BF-81CC-4CC8-A889-EBC3FE864230}"/>
                 </a:ext>
               </a:extLst>
             </p:cNvPr>
             <p:cNvCxnSpPr>
               <a:cxnSpLocks/>
-              <a:stCxn id="43" idx="1"/>
             </p:cNvCxnSpPr>
             <p:nvPr/>
           </p:nvCxnSpPr>
           <p:spPr>
-            <a:xfrm flipH="1">
-              <a:off x="8306131" y="5454641"/>
-              <a:ext cx="762502" cy="10055"/>
+            <a:xfrm>
+              <a:off x="8475965" y="4537325"/>
+              <a:ext cx="762502" cy="0"/>
             </a:xfrm>
             <a:prstGeom prst="straightConnector1">
               <a:avLst/>
@@ -4075,24 +4501,69 @@
             </a:fontRef>
           </p:style>
         </p:cxnSp>
+        <p:sp>
+          <p:nvSpPr>
+            <p:cNvPr id="54" name="TextBox 53">
+              <a:extLst>
+                <a:ext uri="{FF2B5EF4-FFF2-40B4-BE49-F238E27FC236}">
+                  <a16:creationId xmlns:a16="http://schemas.microsoft.com/office/drawing/2014/main" id="{601471B6-8E72-4757-BCA4-7136B4D1C0A9}"/>
+                </a:ext>
+              </a:extLst>
+            </p:cNvPr>
+            <p:cNvSpPr txBox="1"/>
+            <p:nvPr/>
+          </p:nvSpPr>
+          <p:spPr>
+            <a:xfrm>
+              <a:off x="8448413" y="4015476"/>
+              <a:ext cx="839163" cy="523220"/>
+            </a:xfrm>
+            <a:prstGeom prst="rect">
+              <a:avLst/>
+            </a:prstGeom>
+            <a:noFill/>
+          </p:spPr>
+          <p:txBody>
+            <a:bodyPr wrap="square" rtlCol="0">
+              <a:spAutoFit/>
+            </a:bodyPr>
+            <a:lstStyle/>
+            <a:p>
+              <a:pPr algn="ctr"/>
+              <a:r>
+                <a:rPr lang="en-US" sz="1400" b="1" dirty="0"/>
+                <a:t>DEV-04</a:t>
+              </a:r>
+            </a:p>
+            <a:p>
+              <a:pPr algn="ctr"/>
+              <a:r>
+                <a:rPr lang="en-US" sz="1400" b="1" dirty="0"/>
+                <a:t>(PCD-04)</a:t>
+              </a:r>
+              <a:endParaRPr lang="en-US" sz="1600" b="1" dirty="0"/>
+            </a:p>
+          </p:txBody>
+        </p:sp>
         <p:cxnSp>
           <p:nvCxnSpPr>
-            <p:cNvPr id="49" name="Straight Arrow Connector 48">
+            <p:cNvPr id="48" name="Straight Arrow Connector 47">
               <a:extLst>
                 <a:ext uri="{FF2B5EF4-FFF2-40B4-BE49-F238E27FC236}">
-                  <a16:creationId xmlns:a16="http://schemas.microsoft.com/office/drawing/2014/main" id="{F94709BF-81CC-4CC8-A889-EBC3FE864230}"/>
+                  <a16:creationId xmlns:a16="http://schemas.microsoft.com/office/drawing/2014/main" id="{1E7A4FE6-F54F-40CD-99F7-CD1A5FB8E5C1}"/>
                 </a:ext>
               </a:extLst>
             </p:cNvPr>
             <p:cNvCxnSpPr>
               <a:cxnSpLocks/>
+              <a:stCxn id="43" idx="1"/>
             </p:cNvCxnSpPr>
             <p:nvPr/>
           </p:nvCxnSpPr>
           <p:spPr>
-            <a:xfrm>
-              <a:off x="8306131" y="5260957"/>
-              <a:ext cx="762502" cy="0"/>
+            <a:xfrm flipH="1">
+              <a:off x="8475965" y="4731009"/>
+              <a:ext cx="762502" cy="10055"/>
             </a:xfrm>
             <a:prstGeom prst="straightConnector1">
               <a:avLst/>
@@ -4130,7 +4601,7 @@
           </p:nvSpPr>
           <p:spPr>
             <a:xfrm>
-              <a:off x="8329951" y="5469756"/>
+              <a:off x="8438141" y="4740991"/>
               <a:ext cx="839162" cy="307777"/>
             </a:xfrm>
             <a:prstGeom prst="rect">
@@ -4144,6 +4615,7 @@
             </a:bodyPr>
             <a:lstStyle/>
             <a:p>
+              <a:pPr algn="ctr"/>
               <a:r>
                 <a:rPr lang="en-US" sz="1400" b="1" dirty="0"/>
                 <a:t>DEV-04</a:t>
@@ -4154,10 +4626,10 @@
         </p:sp>
         <p:sp>
           <p:nvSpPr>
-            <p:cNvPr id="54" name="TextBox 53">
+            <p:cNvPr id="117" name="TextBox 116">
               <a:extLst>
                 <a:ext uri="{FF2B5EF4-FFF2-40B4-BE49-F238E27FC236}">
-                  <a16:creationId xmlns:a16="http://schemas.microsoft.com/office/drawing/2014/main" id="{601471B6-8E72-4757-BCA4-7136B4D1C0A9}"/>
+                  <a16:creationId xmlns:a16="http://schemas.microsoft.com/office/drawing/2014/main" id="{93A029E3-F618-4526-AEEF-DEF4027F8F96}"/>
                 </a:ext>
               </a:extLst>
             </p:cNvPr>
@@ -4166,7 +4638,44 @@
           </p:nvSpPr>
           <p:spPr>
             <a:xfrm>
-              <a:off x="8329949" y="4954862"/>
+              <a:off x="8438139" y="4917876"/>
+              <a:ext cx="839163" cy="307777"/>
+            </a:xfrm>
+            <a:prstGeom prst="rect">
+              <a:avLst/>
+            </a:prstGeom>
+            <a:noFill/>
+          </p:spPr>
+          <p:txBody>
+            <a:bodyPr wrap="square" rtlCol="0">
+              <a:spAutoFit/>
+            </a:bodyPr>
+            <a:lstStyle/>
+            <a:p>
+              <a:pPr algn="ctr"/>
+              <a:r>
+                <a:rPr lang="en-US" sz="1400" b="1" dirty="0"/>
+                <a:t>DEV-05</a:t>
+              </a:r>
+              <a:endParaRPr lang="en-US" sz="1600" b="1" dirty="0"/>
+            </a:p>
+          </p:txBody>
+        </p:sp>
+        <p:sp>
+          <p:nvSpPr>
+            <p:cNvPr id="3" name="TextBox 2">
+              <a:extLst>
+                <a:ext uri="{FF2B5EF4-FFF2-40B4-BE49-F238E27FC236}">
+                  <a16:creationId xmlns:a16="http://schemas.microsoft.com/office/drawing/2014/main" id="{60CC9CE7-7524-5068-51AA-27780CDFE614}"/>
+                </a:ext>
+              </a:extLst>
+            </p:cNvPr>
+            <p:cNvSpPr txBox="1"/>
+            <p:nvPr/>
+          </p:nvSpPr>
+          <p:spPr>
+            <a:xfrm>
+              <a:off x="8453550" y="5137404"/>
               <a:ext cx="839163" cy="307777"/>
             </a:xfrm>
             <a:prstGeom prst="rect">
@@ -4182,172 +4691,17 @@
             <a:p>
               <a:r>
                 <a:rPr lang="en-US" sz="1400" b="1" dirty="0"/>
-                <a:t>DEV-04</a:t>
+                <a:t>(PCD-04</a:t>
               </a:r>
-              <a:endParaRPr lang="en-US" sz="1600" b="1" dirty="0"/>
             </a:p>
           </p:txBody>
         </p:sp>
-        <p:grpSp>
-          <p:nvGrpSpPr>
-            <p:cNvPr id="58" name="Group 57">
+        <p:sp>
+          <p:nvSpPr>
+            <p:cNvPr id="4" name="TextBox 3">
               <a:extLst>
                 <a:ext uri="{FF2B5EF4-FFF2-40B4-BE49-F238E27FC236}">
-                  <a16:creationId xmlns:a16="http://schemas.microsoft.com/office/drawing/2014/main" id="{44127504-210F-40C5-8D51-5BAF1DB0E7BF}"/>
-                </a:ext>
-              </a:extLst>
-            </p:cNvPr>
-            <p:cNvGrpSpPr/>
-            <p:nvPr/>
-          </p:nvGrpSpPr>
-          <p:grpSpPr>
-            <a:xfrm>
-              <a:off x="6772081" y="4957187"/>
-              <a:ext cx="1534050" cy="1581239"/>
-              <a:chOff x="7967835" y="4746171"/>
-              <a:chExt cx="1534050" cy="1581239"/>
-            </a:xfrm>
-          </p:grpSpPr>
-          <p:sp>
-            <p:nvSpPr>
-              <p:cNvPr id="38" name="Rectangle 37">
-                <a:extLst>
-                  <a:ext uri="{FF2B5EF4-FFF2-40B4-BE49-F238E27FC236}">
-                    <a16:creationId xmlns:a16="http://schemas.microsoft.com/office/drawing/2014/main" id="{EA47650F-24B8-47F8-81C1-EAD8604E55FB}"/>
-                  </a:ext>
-                </a:extLst>
-              </p:cNvPr>
-              <p:cNvSpPr/>
-              <p:nvPr/>
-            </p:nvSpPr>
-            <p:spPr>
-              <a:xfrm>
-                <a:off x="7967835" y="4746171"/>
-                <a:ext cx="1534050" cy="951244"/>
-              </a:xfrm>
-              <a:prstGeom prst="rect">
-                <a:avLst/>
-              </a:prstGeom>
-              <a:solidFill>
-                <a:schemeClr val="bg1"/>
-              </a:solidFill>
-              <a:ln w="6350">
-                <a:solidFill>
-                  <a:schemeClr val="tx1"/>
-                </a:solidFill>
-              </a:ln>
-            </p:spPr>
-            <p:style>
-              <a:lnRef idx="2">
-                <a:schemeClr val="accent1">
-                  <a:shade val="50000"/>
-                </a:schemeClr>
-              </a:lnRef>
-              <a:fillRef idx="1">
-                <a:schemeClr val="accent1"/>
-              </a:fillRef>
-              <a:effectRef idx="0">
-                <a:schemeClr val="accent1"/>
-              </a:effectRef>
-              <a:fontRef idx="minor">
-                <a:schemeClr val="lt1"/>
-              </a:fontRef>
-            </p:style>
-            <p:txBody>
-              <a:bodyPr rtlCol="0" anchor="ctr" anchorCtr="1"/>
-              <a:lstStyle/>
-              <a:p>
-                <a:pPr algn="ctr"/>
-                <a:r>
-                  <a:rPr lang="en-US" b="1" dirty="0">
-                    <a:solidFill>
-                      <a:schemeClr val="tx1"/>
-                    </a:solidFill>
-                  </a:rPr>
-                  <a:t>SOMDS </a:t>
-                </a:r>
-              </a:p>
-              <a:p>
-                <a:pPr algn="ctr"/>
-                <a:r>
-                  <a:rPr lang="en-US" b="1" dirty="0">
-                    <a:solidFill>
-                      <a:schemeClr val="tx1"/>
-                    </a:solidFill>
-                  </a:rPr>
-                  <a:t>ACM Gateway</a:t>
-                </a:r>
-              </a:p>
-            </p:txBody>
-          </p:sp>
-          <p:sp>
-            <p:nvSpPr>
-              <p:cNvPr id="57" name="Rectangle 56">
-                <a:extLst>
-                  <a:ext uri="{FF2B5EF4-FFF2-40B4-BE49-F238E27FC236}">
-                    <a16:creationId xmlns:a16="http://schemas.microsoft.com/office/drawing/2014/main" id="{28B54E69-316E-4739-BFC6-68E6480FE06F}"/>
-                  </a:ext>
-                </a:extLst>
-              </p:cNvPr>
-              <p:cNvSpPr/>
-              <p:nvPr/>
-            </p:nvSpPr>
-            <p:spPr>
-              <a:xfrm>
-                <a:off x="7968343" y="5701713"/>
-                <a:ext cx="1533542" cy="625697"/>
-              </a:xfrm>
-              <a:prstGeom prst="rect">
-                <a:avLst/>
-              </a:prstGeom>
-              <a:solidFill>
-                <a:schemeClr val="bg1"/>
-              </a:solidFill>
-              <a:ln w="6350">
-                <a:solidFill>
-                  <a:schemeClr val="tx1"/>
-                </a:solidFill>
-              </a:ln>
-            </p:spPr>
-            <p:style>
-              <a:lnRef idx="2">
-                <a:schemeClr val="accent1">
-                  <a:shade val="50000"/>
-                </a:schemeClr>
-              </a:lnRef>
-              <a:fillRef idx="1">
-                <a:schemeClr val="accent1"/>
-              </a:fillRef>
-              <a:effectRef idx="0">
-                <a:schemeClr val="accent1"/>
-              </a:effectRef>
-              <a:fontRef idx="minor">
-                <a:schemeClr val="lt1"/>
-              </a:fontRef>
-            </p:style>
-            <p:txBody>
-              <a:bodyPr rtlCol="0" anchor="ctr" anchorCtr="1"/>
-              <a:lstStyle/>
-              <a:p>
-                <a:pPr algn="ctr"/>
-                <a:r>
-                  <a:rPr lang="en-US" b="1" dirty="0">
-                    <a:solidFill>
-                      <a:schemeClr val="tx1"/>
-                    </a:solidFill>
-                  </a:rPr>
-                  <a:t>SOMDS V2 Gateway</a:t>
-                </a:r>
-              </a:p>
-            </p:txBody>
-          </p:sp>
-        </p:grpSp>
-        <p:sp>
-          <p:nvSpPr>
-            <p:cNvPr id="117" name="TextBox 116">
-              <a:extLst>
-                <a:ext uri="{FF2B5EF4-FFF2-40B4-BE49-F238E27FC236}">
-                  <a16:creationId xmlns:a16="http://schemas.microsoft.com/office/drawing/2014/main" id="{93A029E3-F618-4526-AEEF-DEF4027F8F96}"/>
+                  <a16:creationId xmlns:a16="http://schemas.microsoft.com/office/drawing/2014/main" id="{8AFD4D66-6811-0FA3-6372-B75010376E1F}"/>
                 </a:ext>
               </a:extLst>
             </p:cNvPr>
@@ -4356,7 +4710,7 @@
           </p:nvSpPr>
           <p:spPr>
             <a:xfrm>
-              <a:off x="8329949" y="5646641"/>
+              <a:off x="8443276" y="5300408"/>
               <a:ext cx="839163" cy="307777"/>
             </a:xfrm>
             <a:prstGeom prst="rect">
@@ -4370,288 +4724,16 @@
             </a:bodyPr>
             <a:lstStyle/>
             <a:p>
+              <a:pPr algn="r"/>
               <a:r>
                 <a:rPr lang="en-US" sz="1400" b="1" dirty="0"/>
-                <a:t>DEV-05</a:t>
+                <a:t>PCD-05)</a:t>
               </a:r>
               <a:endParaRPr lang="en-US" sz="1600" b="1" dirty="0"/>
             </a:p>
           </p:txBody>
         </p:sp>
       </p:grpSp>
-      <p:sp>
-        <p:nvSpPr>
-          <p:cNvPr id="122" name="TextBox 121">
-            <a:extLst>
-              <a:ext uri="{FF2B5EF4-FFF2-40B4-BE49-F238E27FC236}">
-                <a16:creationId xmlns:a16="http://schemas.microsoft.com/office/drawing/2014/main" id="{11A13635-0767-4EDF-8B12-E6C96938A5B1}"/>
-              </a:ext>
-            </a:extLst>
-          </p:cNvPr>
-          <p:cNvSpPr txBox="1"/>
-          <p:nvPr/>
-        </p:nvSpPr>
-        <p:spPr>
-          <a:xfrm>
-            <a:off x="3819891" y="3432933"/>
-            <a:ext cx="1786975" cy="523220"/>
-          </a:xfrm>
-          <a:prstGeom prst="rect">
-            <a:avLst/>
-          </a:prstGeom>
-          <a:noFill/>
-        </p:spPr>
-        <p:txBody>
-          <a:bodyPr wrap="square" rtlCol="0">
-            <a:spAutoFit/>
-          </a:bodyPr>
-          <a:lstStyle/>
-          <a:p>
-            <a:r>
-              <a:rPr lang="en-US" sz="1400" b="1" dirty="0"/>
-              <a:t>DEV-42  Delegate Medical Alert</a:t>
-            </a:r>
-            <a:endParaRPr lang="en-US" sz="1600" b="1" dirty="0"/>
-          </a:p>
-        </p:txBody>
-      </p:sp>
-      <p:sp>
-        <p:nvSpPr>
-          <p:cNvPr id="125" name="TextBox 124">
-            <a:extLst>
-              <a:ext uri="{FF2B5EF4-FFF2-40B4-BE49-F238E27FC236}">
-                <a16:creationId xmlns:a16="http://schemas.microsoft.com/office/drawing/2014/main" id="{68B13C05-354D-4B41-BD25-0D51758A5F86}"/>
-              </a:ext>
-            </a:extLst>
-          </p:cNvPr>
-          <p:cNvSpPr txBox="1"/>
-          <p:nvPr/>
-        </p:nvSpPr>
-        <p:spPr>
-          <a:xfrm>
-            <a:off x="1486305" y="2884255"/>
-            <a:ext cx="2069327" cy="523220"/>
-          </a:xfrm>
-          <a:prstGeom prst="rect">
-            <a:avLst/>
-          </a:prstGeom>
-          <a:noFill/>
-        </p:spPr>
-        <p:txBody>
-          <a:bodyPr wrap="square" rtlCol="0">
-            <a:spAutoFit/>
-          </a:bodyPr>
-          <a:lstStyle/>
-          <a:p>
-            <a:r>
-              <a:rPr lang="en-US" sz="1400" b="1" dirty="0"/>
-              <a:t>DEV-40  Retrieve Medical Alert Status</a:t>
-            </a:r>
-            <a:endParaRPr lang="en-US" sz="1600" b="1" dirty="0"/>
-          </a:p>
-        </p:txBody>
-      </p:sp>
-      <p:sp>
-        <p:nvSpPr>
-          <p:cNvPr id="128" name="TextBox 127">
-            <a:extLst>
-              <a:ext uri="{FF2B5EF4-FFF2-40B4-BE49-F238E27FC236}">
-                <a16:creationId xmlns:a16="http://schemas.microsoft.com/office/drawing/2014/main" id="{9E4F6F83-F9C6-44F4-AE44-133242813C34}"/>
-              </a:ext>
-            </a:extLst>
-          </p:cNvPr>
-          <p:cNvSpPr txBox="1"/>
-          <p:nvPr/>
-        </p:nvSpPr>
-        <p:spPr>
-          <a:xfrm>
-            <a:off x="5944623" y="4228885"/>
-            <a:ext cx="1210822" cy="307777"/>
-          </a:xfrm>
-          <a:prstGeom prst="rect">
-            <a:avLst/>
-          </a:prstGeom>
-          <a:noFill/>
-        </p:spPr>
-        <p:txBody>
-          <a:bodyPr wrap="square" rtlCol="0">
-            <a:spAutoFit/>
-          </a:bodyPr>
-          <a:lstStyle/>
-          <a:p>
-            <a:r>
-              <a:rPr lang="en-US" sz="1400" b="1" dirty="0"/>
-              <a:t>DEV-38</a:t>
-            </a:r>
-            <a:endParaRPr lang="en-US" sz="1600" b="1" dirty="0"/>
-          </a:p>
-        </p:txBody>
-      </p:sp>
-      <p:sp>
-        <p:nvSpPr>
-          <p:cNvPr id="130" name="TextBox 129">
-            <a:extLst>
-              <a:ext uri="{FF2B5EF4-FFF2-40B4-BE49-F238E27FC236}">
-                <a16:creationId xmlns:a16="http://schemas.microsoft.com/office/drawing/2014/main" id="{44187627-A7B1-4C14-B8D8-97827428FD25}"/>
-              </a:ext>
-            </a:extLst>
-          </p:cNvPr>
-          <p:cNvSpPr txBox="1"/>
-          <p:nvPr/>
-        </p:nvSpPr>
-        <p:spPr>
-          <a:xfrm>
-            <a:off x="1486304" y="3918684"/>
-            <a:ext cx="2202739" cy="523220"/>
-          </a:xfrm>
-          <a:prstGeom prst="rect">
-            <a:avLst/>
-          </a:prstGeom>
-          <a:noFill/>
-        </p:spPr>
-        <p:txBody>
-          <a:bodyPr wrap="square" rtlCol="0">
-            <a:spAutoFit/>
-          </a:bodyPr>
-          <a:lstStyle/>
-          <a:p>
-            <a:r>
-              <a:rPr lang="en-US" sz="1400" b="1" dirty="0"/>
-              <a:t>DEV-43  Update Alert Acknowledgement Status</a:t>
-            </a:r>
-            <a:endParaRPr lang="en-US" sz="1600" b="1" dirty="0"/>
-          </a:p>
-        </p:txBody>
-      </p:sp>
-      <p:sp>
-        <p:nvSpPr>
-          <p:cNvPr id="134" name="TextBox 133">
-            <a:extLst>
-              <a:ext uri="{FF2B5EF4-FFF2-40B4-BE49-F238E27FC236}">
-                <a16:creationId xmlns:a16="http://schemas.microsoft.com/office/drawing/2014/main" id="{77799404-9EC7-4B77-9605-1C7459A69B04}"/>
-              </a:ext>
-            </a:extLst>
-          </p:cNvPr>
-          <p:cNvSpPr txBox="1"/>
-          <p:nvPr/>
-        </p:nvSpPr>
-        <p:spPr>
-          <a:xfrm>
-            <a:off x="5944623" y="4418567"/>
-            <a:ext cx="1210823" cy="307777"/>
-          </a:xfrm>
-          <a:prstGeom prst="rect">
-            <a:avLst/>
-          </a:prstGeom>
-          <a:noFill/>
-        </p:spPr>
-        <p:txBody>
-          <a:bodyPr wrap="square" rtlCol="0">
-            <a:spAutoFit/>
-          </a:bodyPr>
-          <a:lstStyle/>
-          <a:p>
-            <a:r>
-              <a:rPr lang="en-US" sz="1400" b="1" dirty="0"/>
-              <a:t>DEV-40</a:t>
-            </a:r>
-            <a:endParaRPr lang="en-US" sz="1600" b="1" dirty="0"/>
-          </a:p>
-        </p:txBody>
-      </p:sp>
-      <p:sp>
-        <p:nvSpPr>
-          <p:cNvPr id="136" name="TextBox 135">
-            <a:extLst>
-              <a:ext uri="{FF2B5EF4-FFF2-40B4-BE49-F238E27FC236}">
-                <a16:creationId xmlns:a16="http://schemas.microsoft.com/office/drawing/2014/main" id="{A038C248-B180-477E-8CB9-8157FCDF9BBC}"/>
-              </a:ext>
-            </a:extLst>
-          </p:cNvPr>
-          <p:cNvSpPr txBox="1"/>
-          <p:nvPr/>
-        </p:nvSpPr>
-        <p:spPr>
-          <a:xfrm>
-            <a:off x="5944623" y="4584880"/>
-            <a:ext cx="1210823" cy="307777"/>
-          </a:xfrm>
-          <a:prstGeom prst="rect">
-            <a:avLst/>
-          </a:prstGeom>
-          <a:noFill/>
-        </p:spPr>
-        <p:txBody>
-          <a:bodyPr wrap="square" rtlCol="0">
-            <a:spAutoFit/>
-          </a:bodyPr>
-          <a:lstStyle/>
-          <a:p>
-            <a:r>
-              <a:rPr lang="en-US" sz="1400" b="1" dirty="0"/>
-              <a:t>DEV-43</a:t>
-            </a:r>
-            <a:endParaRPr lang="en-US" sz="1600" b="1" dirty="0"/>
-          </a:p>
-        </p:txBody>
-      </p:sp>
-      <p:sp>
-        <p:nvSpPr>
-          <p:cNvPr id="2" name="Rectangle 1">
-            <a:extLst>
-              <a:ext uri="{FF2B5EF4-FFF2-40B4-BE49-F238E27FC236}">
-                <a16:creationId xmlns:a16="http://schemas.microsoft.com/office/drawing/2014/main" id="{CCC843D0-5E6F-4EEE-8B5F-BBB28E3EBA0E}"/>
-              </a:ext>
-            </a:extLst>
-          </p:cNvPr>
-          <p:cNvSpPr/>
-          <p:nvPr/>
-        </p:nvSpPr>
-        <p:spPr>
-          <a:xfrm>
-            <a:off x="1284850" y="1043205"/>
-            <a:ext cx="4322016" cy="4771575"/>
-          </a:xfrm>
-          <a:prstGeom prst="rect">
-            <a:avLst/>
-          </a:prstGeom>
-          <a:noFill/>
-          <a:ln w="12700">
-            <a:solidFill>
-              <a:schemeClr val="tx1"/>
-            </a:solidFill>
-            <a:prstDash val="dash"/>
-          </a:ln>
-        </p:spPr>
-        <p:style>
-          <a:lnRef idx="2">
-            <a:schemeClr val="accent1">
-              <a:shade val="50000"/>
-            </a:schemeClr>
-          </a:lnRef>
-          <a:fillRef idx="1">
-            <a:schemeClr val="accent1"/>
-          </a:fillRef>
-          <a:effectRef idx="0">
-            <a:schemeClr val="accent1"/>
-          </a:effectRef>
-          <a:fontRef idx="minor">
-            <a:schemeClr val="lt1"/>
-          </a:fontRef>
-        </p:style>
-        <p:txBody>
-          <a:bodyPr rtlCol="0" anchor="b" anchorCtr="0"/>
-          <a:lstStyle/>
-          <a:p>
-            <a:pPr algn="ctr"/>
-            <a:endParaRPr lang="en-US" dirty="0">
-              <a:solidFill>
-                <a:schemeClr val="tx1"/>
-              </a:solidFill>
-            </a:endParaRPr>
-          </a:p>
-        </p:txBody>
-      </p:sp>
     </p:spTree>
     <p:extLst>
       <p:ext uri="{BB962C8B-B14F-4D97-AF65-F5344CB8AC3E}">

</xml_diff>